<commit_message>
added js basics powerpoint kickstart
</commit_message>
<xml_diff>
--- a/JS Fundamentals/1.Intro/JS-Fund-Intro.pptx
+++ b/JS Fundamentals/1.Intro/JS-Fund-Intro.pptx
@@ -6,16 +6,18 @@
   </p:sldMasterIdLst>
   <p:sldIdLst>
     <p:sldId id="256" r:id="rId2"/>
-    <p:sldId id="257" r:id="rId3"/>
-    <p:sldId id="258" r:id="rId4"/>
-    <p:sldId id="259" r:id="rId5"/>
-    <p:sldId id="260" r:id="rId6"/>
-    <p:sldId id="261" r:id="rId7"/>
-    <p:sldId id="262" r:id="rId8"/>
-    <p:sldId id="263" r:id="rId9"/>
-    <p:sldId id="264" r:id="rId10"/>
-    <p:sldId id="265" r:id="rId11"/>
-    <p:sldId id="266" r:id="rId12"/>
+    <p:sldId id="267" r:id="rId3"/>
+    <p:sldId id="257" r:id="rId4"/>
+    <p:sldId id="258" r:id="rId5"/>
+    <p:sldId id="259" r:id="rId6"/>
+    <p:sldId id="260" r:id="rId7"/>
+    <p:sldId id="261" r:id="rId8"/>
+    <p:sldId id="262" r:id="rId9"/>
+    <p:sldId id="263" r:id="rId10"/>
+    <p:sldId id="264" r:id="rId11"/>
+    <p:sldId id="265" r:id="rId12"/>
+    <p:sldId id="268" r:id="rId13"/>
+    <p:sldId id="266" r:id="rId14"/>
   </p:sldIdLst>
   <p:sldSz cx="12192000" cy="6858000"/>
   <p:notesSz cx="6858000" cy="9144000"/>
@@ -114,6 +116,11 @@
       </a:defRPr>
     </a:lvl9pPr>
   </p:defaultTextStyle>
+  <p:extLst>
+    <p:ext uri="{EFAFB233-063F-42B5-8137-9DF3F51BA10A}">
+      <p15:sldGuideLst xmlns:p15="http://schemas.microsoft.com/office/powerpoint/2012/main"/>
+    </p:ext>
+  </p:extLst>
 </p:presentation>
 </file>
 
@@ -619,7 +626,7 @@
           <a:p>
             <a:fld id="{6F66794D-9D79-4AC5-96DA-597EA4BF2704}" type="datetimeFigureOut">
               <a:rPr lang="en-US" smtClean="0"/>
-              <a:t>23-Mar-16</a:t>
+              <a:t>24-Mar-16</a:t>
             </a:fld>
             <a:endParaRPr lang="en-US"/>
           </a:p>
@@ -952,7 +959,7 @@
           <a:p>
             <a:fld id="{6F66794D-9D79-4AC5-96DA-597EA4BF2704}" type="datetimeFigureOut">
               <a:rPr lang="en-US" smtClean="0"/>
-              <a:t>23-Mar-16</a:t>
+              <a:t>24-Mar-16</a:t>
             </a:fld>
             <a:endParaRPr lang="en-US"/>
           </a:p>
@@ -1200,7 +1207,7 @@
           <a:p>
             <a:fld id="{6F66794D-9D79-4AC5-96DA-597EA4BF2704}" type="datetimeFigureOut">
               <a:rPr lang="en-US" smtClean="0"/>
-              <a:t>23-Mar-16</a:t>
+              <a:t>24-Mar-16</a:t>
             </a:fld>
             <a:endParaRPr lang="en-US"/>
           </a:p>
@@ -1740,7 +1747,7 @@
           <a:p>
             <a:fld id="{6F66794D-9D79-4AC5-96DA-597EA4BF2704}" type="datetimeFigureOut">
               <a:rPr lang="en-US" smtClean="0"/>
-              <a:t>23-Mar-16</a:t>
+              <a:t>24-Mar-16</a:t>
             </a:fld>
             <a:endParaRPr lang="en-US"/>
           </a:p>
@@ -1988,7 +1995,7 @@
           <a:p>
             <a:fld id="{6F66794D-9D79-4AC5-96DA-597EA4BF2704}" type="datetimeFigureOut">
               <a:rPr lang="en-US" smtClean="0"/>
-              <a:t>23-Mar-16</a:t>
+              <a:t>24-Mar-16</a:t>
             </a:fld>
             <a:endParaRPr lang="en-US"/>
           </a:p>
@@ -2520,7 +2527,7 @@
           <a:p>
             <a:fld id="{6F66794D-9D79-4AC5-96DA-597EA4BF2704}" type="datetimeFigureOut">
               <a:rPr lang="en-US" smtClean="0"/>
-              <a:t>23-Mar-16</a:t>
+              <a:t>24-Mar-16</a:t>
             </a:fld>
             <a:endParaRPr lang="en-US"/>
           </a:p>
@@ -2817,7 +2824,7 @@
           <a:p>
             <a:fld id="{6F66794D-9D79-4AC5-96DA-597EA4BF2704}" type="datetimeFigureOut">
               <a:rPr lang="en-US" smtClean="0"/>
-              <a:t>23-Mar-16</a:t>
+              <a:t>24-Mar-16</a:t>
             </a:fld>
             <a:endParaRPr lang="en-US"/>
           </a:p>
@@ -2991,7 +2998,7 @@
           <a:p>
             <a:fld id="{6F66794D-9D79-4AC5-96DA-597EA4BF2704}" type="datetimeFigureOut">
               <a:rPr lang="en-US" smtClean="0"/>
-              <a:t>23-Mar-16</a:t>
+              <a:t>24-Mar-16</a:t>
             </a:fld>
             <a:endParaRPr lang="en-US"/>
           </a:p>
@@ -3171,7 +3178,7 @@
           <a:p>
             <a:fld id="{6F66794D-9D79-4AC5-96DA-597EA4BF2704}" type="datetimeFigureOut">
               <a:rPr lang="en-US" smtClean="0"/>
-              <a:t>23-Mar-16</a:t>
+              <a:t>24-Mar-16</a:t>
             </a:fld>
             <a:endParaRPr lang="en-US"/>
           </a:p>
@@ -3341,7 +3348,7 @@
           <a:p>
             <a:fld id="{6F66794D-9D79-4AC5-96DA-597EA4BF2704}" type="datetimeFigureOut">
               <a:rPr lang="en-US" smtClean="0"/>
-              <a:t>23-Mar-16</a:t>
+              <a:t>24-Mar-16</a:t>
             </a:fld>
             <a:endParaRPr lang="en-US"/>
           </a:p>
@@ -3629,7 +3636,7 @@
           <a:p>
             <a:fld id="{6F66794D-9D79-4AC5-96DA-597EA4BF2704}" type="datetimeFigureOut">
               <a:rPr lang="en-US" smtClean="0"/>
-              <a:t>23-Mar-16</a:t>
+              <a:t>24-Mar-16</a:t>
             </a:fld>
             <a:endParaRPr lang="en-US"/>
           </a:p>
@@ -3933,7 +3940,7 @@
           <a:p>
             <a:fld id="{6F66794D-9D79-4AC5-96DA-597EA4BF2704}" type="datetimeFigureOut">
               <a:rPr lang="en-US" smtClean="0"/>
-              <a:t>23-Mar-16</a:t>
+              <a:t>24-Mar-16</a:t>
             </a:fld>
             <a:endParaRPr lang="en-US"/>
           </a:p>
@@ -4412,7 +4419,7 @@
           <a:p>
             <a:fld id="{6F66794D-9D79-4AC5-96DA-597EA4BF2704}" type="datetimeFigureOut">
               <a:rPr lang="en-US" smtClean="0"/>
-              <a:t>23-Mar-16</a:t>
+              <a:t>24-Mar-16</a:t>
             </a:fld>
             <a:endParaRPr lang="en-US"/>
           </a:p>
@@ -4567,7 +4574,7 @@
           <a:p>
             <a:fld id="{6F66794D-9D79-4AC5-96DA-597EA4BF2704}" type="datetimeFigureOut">
               <a:rPr lang="en-US" smtClean="0"/>
-              <a:t>23-Mar-16</a:t>
+              <a:t>24-Mar-16</a:t>
             </a:fld>
             <a:endParaRPr lang="en-US"/>
           </a:p>
@@ -4662,7 +4669,7 @@
           <a:p>
             <a:fld id="{6F66794D-9D79-4AC5-96DA-597EA4BF2704}" type="datetimeFigureOut">
               <a:rPr lang="en-US" smtClean="0"/>
-              <a:t>23-Mar-16</a:t>
+              <a:t>24-Mar-16</a:t>
             </a:fld>
             <a:endParaRPr lang="en-US"/>
           </a:p>
@@ -4945,7 +4952,7 @@
           <a:p>
             <a:fld id="{6F66794D-9D79-4AC5-96DA-597EA4BF2704}" type="datetimeFigureOut">
               <a:rPr lang="en-US" smtClean="0"/>
-              <a:t>23-Mar-16</a:t>
+              <a:t>24-Mar-16</a:t>
             </a:fld>
             <a:endParaRPr lang="en-US"/>
           </a:p>
@@ -5236,7 +5243,7 @@
           <a:p>
             <a:fld id="{6F66794D-9D79-4AC5-96DA-597EA4BF2704}" type="datetimeFigureOut">
               <a:rPr lang="en-US" smtClean="0"/>
-              <a:t>23-Mar-16</a:t>
+              <a:t>24-Mar-16</a:t>
             </a:fld>
             <a:endParaRPr lang="en-US"/>
           </a:p>
@@ -5766,7 +5773,7 @@
           <a:p>
             <a:fld id="{6F66794D-9D79-4AC5-96DA-597EA4BF2704}" type="datetimeFigureOut">
               <a:rPr lang="en-US" smtClean="0"/>
-              <a:t>23-Mar-16</a:t>
+              <a:t>24-Mar-16</a:t>
             </a:fld>
             <a:endParaRPr lang="en-US"/>
           </a:p>
@@ -6440,6 +6447,208 @@
           <a:p>
             <a:r>
               <a:rPr lang="bg-BG" dirty="0" smtClean="0"/>
+              <a:t>Дебъгване и намиране на грешки</a:t>
+            </a:r>
+            <a:endParaRPr lang="en-US" dirty="0"/>
+          </a:p>
+        </p:txBody>
+      </p:sp>
+      <p:sp>
+        <p:nvSpPr>
+          <p:cNvPr id="3" name="Content Placeholder 2"/>
+          <p:cNvSpPr>
+            <a:spLocks noGrp="1"/>
+          </p:cNvSpPr>
+          <p:nvPr>
+            <p:ph idx="1"/>
+          </p:nvPr>
+        </p:nvSpPr>
+        <p:spPr/>
+        <p:txBody>
+          <a:bodyPr>
+            <a:normAutofit lnSpcReduction="10000"/>
+          </a:bodyPr>
+          <a:lstStyle/>
+          <a:p>
+            <a:r>
+              <a:rPr lang="bg-BG" dirty="0" smtClean="0"/>
+              <a:t>Интернет браузър</a:t>
+            </a:r>
+          </a:p>
+          <a:p>
+            <a:pPr lvl="1"/>
+            <a:r>
+              <a:rPr lang="bg-BG" dirty="0" smtClean="0"/>
+              <a:t>Съвременните браузъри предоставят богат набор от инструменти за дебъгване</a:t>
+            </a:r>
+          </a:p>
+          <a:p>
+            <a:pPr lvl="1"/>
+            <a:r>
+              <a:rPr lang="en-US" dirty="0" smtClean="0"/>
+              <a:t>F12 </a:t>
+            </a:r>
+            <a:r>
+              <a:rPr lang="bg-BG" dirty="0" smtClean="0"/>
+              <a:t>инструменти</a:t>
+            </a:r>
+          </a:p>
+          <a:p>
+            <a:pPr lvl="1"/>
+            <a:r>
+              <a:rPr lang="bg-BG" dirty="0" smtClean="0"/>
+              <a:t>*</a:t>
+            </a:r>
+            <a:r>
+              <a:rPr lang="en-US" dirty="0" smtClean="0">
+                <a:hlinkClick r:id="rId2"/>
+              </a:rPr>
+              <a:t>FireBug</a:t>
+            </a:r>
+            <a:r>
+              <a:rPr lang="en-US" dirty="0" smtClean="0"/>
+              <a:t> -&gt; </a:t>
+            </a:r>
+            <a:r>
+              <a:rPr lang="bg-BG" dirty="0" smtClean="0"/>
+              <a:t>ако използвате </a:t>
+            </a:r>
+            <a:r>
+              <a:rPr lang="en-US" dirty="0" smtClean="0"/>
+              <a:t>Mozilla Firefox</a:t>
+            </a:r>
+          </a:p>
+          <a:p>
+            <a:r>
+              <a:rPr lang="en-US" dirty="0" smtClean="0"/>
+              <a:t>IDE</a:t>
+            </a:r>
+          </a:p>
+          <a:p>
+            <a:pPr lvl="1"/>
+            <a:r>
+              <a:rPr lang="en-US" dirty="0" smtClean="0"/>
+              <a:t>WebStorm </a:t>
+            </a:r>
+            <a:r>
+              <a:rPr lang="bg-BG" dirty="0" smtClean="0"/>
+              <a:t>предоставя доста добри възможности за дебъгване на  </a:t>
+            </a:r>
+            <a:r>
+              <a:rPr lang="en-US" dirty="0" smtClean="0"/>
+              <a:t>JS </a:t>
+            </a:r>
+            <a:r>
+              <a:rPr lang="bg-BG" dirty="0" smtClean="0"/>
+              <a:t>код</a:t>
+            </a:r>
+          </a:p>
+          <a:p>
+            <a:pPr lvl="1"/>
+            <a:r>
+              <a:rPr lang="en-US" dirty="0" smtClean="0"/>
+              <a:t>Visual Studio</a:t>
+            </a:r>
+            <a:r>
+              <a:rPr lang="bg-BG" dirty="0" smtClean="0"/>
+              <a:t> също дава добри възмоности за дебъгване на </a:t>
+            </a:r>
+            <a:r>
+              <a:rPr lang="en-US" dirty="0" smtClean="0"/>
+              <a:t>JS </a:t>
+            </a:r>
+            <a:r>
+              <a:rPr lang="bg-BG" dirty="0" smtClean="0"/>
+              <a:t>код</a:t>
+            </a:r>
+            <a:endParaRPr lang="en-US" dirty="0"/>
+          </a:p>
+        </p:txBody>
+      </p:sp>
+      <p:pic>
+        <p:nvPicPr>
+          <p:cNvPr id="4" name="Picture 3"/>
+          <p:cNvPicPr>
+            <a:picLocks noChangeAspect="1"/>
+          </p:cNvPicPr>
+          <p:nvPr/>
+        </p:nvPicPr>
+        <p:blipFill>
+          <a:blip r:embed="rId3" cstate="print">
+            <a:extLst>
+              <a:ext uri="{28A0092B-C50C-407E-A947-70E740481C1C}">
+                <a14:useLocalDpi xmlns:a14="http://schemas.microsoft.com/office/drawing/2010/main" val="0"/>
+              </a:ext>
+            </a:extLst>
+          </a:blip>
+          <a:stretch>
+            <a:fillRect/>
+          </a:stretch>
+        </p:blipFill>
+        <p:spPr>
+          <a:xfrm>
+            <a:off x="10181207" y="4927106"/>
+            <a:ext cx="1930893" cy="1930893"/>
+          </a:xfrm>
+          <a:prstGeom prst="rect">
+            <a:avLst/>
+          </a:prstGeom>
+        </p:spPr>
+      </p:pic>
+    </p:spTree>
+    <p:extLst>
+      <p:ext uri="{BB962C8B-B14F-4D97-AF65-F5344CB8AC3E}">
+        <p14:creationId xmlns:p14="http://schemas.microsoft.com/office/powerpoint/2010/main" val="2805176583"/>
+      </p:ext>
+    </p:extLst>
+  </p:cSld>
+  <p:clrMapOvr>
+    <a:masterClrMapping/>
+  </p:clrMapOvr>
+  <p:timing>
+    <p:tnLst>
+      <p:par>
+        <p:cTn id="1" dur="indefinite" restart="never" nodeType="tmRoot"/>
+      </p:par>
+    </p:tnLst>
+  </p:timing>
+</p:sld>
+</file>
+
+<file path=ppt/slides/slide11.xml><?xml version="1.0" encoding="utf-8"?>
+<p:sld xmlns:a="http://schemas.openxmlformats.org/drawingml/2006/main" xmlns:r="http://schemas.openxmlformats.org/officeDocument/2006/relationships" xmlns:p="http://schemas.openxmlformats.org/presentationml/2006/main">
+  <p:cSld>
+    <p:spTree>
+      <p:nvGrpSpPr>
+        <p:cNvPr id="1" name=""/>
+        <p:cNvGrpSpPr/>
+        <p:nvPr/>
+      </p:nvGrpSpPr>
+      <p:grpSpPr>
+        <a:xfrm>
+          <a:off x="0" y="0"/>
+          <a:ext cx="0" cy="0"/>
+          <a:chOff x="0" y="0"/>
+          <a:chExt cx="0" cy="0"/>
+        </a:xfrm>
+      </p:grpSpPr>
+      <p:sp>
+        <p:nvSpPr>
+          <p:cNvPr id="2" name="Title 1"/>
+          <p:cNvSpPr>
+            <a:spLocks noGrp="1"/>
+          </p:cNvSpPr>
+          <p:nvPr>
+            <p:ph type="title"/>
+          </p:nvPr>
+        </p:nvSpPr>
+        <p:spPr/>
+        <p:txBody>
+          <a:bodyPr/>
+          <a:lstStyle/>
+          <a:p>
+            <a:r>
+              <a:rPr lang="bg-BG" dirty="0" smtClean="0"/>
               <a:t>Други </a:t>
             </a:r>
             <a:r>
@@ -6610,7 +6819,240 @@
 </p:sld>
 </file>
 
-<file path=ppt/slides/slide11.xml><?xml version="1.0" encoding="utf-8"?>
+<file path=ppt/slides/slide12.xml><?xml version="1.0" encoding="utf-8"?>
+<p:sld xmlns:a="http://schemas.openxmlformats.org/drawingml/2006/main" xmlns:r="http://schemas.openxmlformats.org/officeDocument/2006/relationships" xmlns:p="http://schemas.openxmlformats.org/presentationml/2006/main">
+  <p:cSld>
+    <p:spTree>
+      <p:nvGrpSpPr>
+        <p:cNvPr id="1" name=""/>
+        <p:cNvGrpSpPr/>
+        <p:nvPr/>
+      </p:nvGrpSpPr>
+      <p:grpSpPr>
+        <a:xfrm>
+          <a:off x="0" y="0"/>
+          <a:ext cx="0" cy="0"/>
+          <a:chOff x="0" y="0"/>
+          <a:chExt cx="0" cy="0"/>
+        </a:xfrm>
+      </p:grpSpPr>
+      <p:sp>
+        <p:nvSpPr>
+          <p:cNvPr id="2" name="Title 1"/>
+          <p:cNvSpPr>
+            <a:spLocks noGrp="1"/>
+          </p:cNvSpPr>
+          <p:nvPr>
+            <p:ph type="title"/>
+          </p:nvPr>
+        </p:nvSpPr>
+        <p:spPr/>
+        <p:txBody>
+          <a:bodyPr/>
+          <a:lstStyle/>
+          <a:p>
+            <a:r>
+              <a:rPr lang="en-US" dirty="0" smtClean="0"/>
+              <a:t>JS </a:t>
+            </a:r>
+            <a:r>
+              <a:rPr lang="bg-BG" dirty="0" smtClean="0"/>
+              <a:t>източници и литература</a:t>
+            </a:r>
+            <a:endParaRPr lang="en-US" dirty="0"/>
+          </a:p>
+        </p:txBody>
+      </p:sp>
+      <p:sp>
+        <p:nvSpPr>
+          <p:cNvPr id="3" name="Content Placeholder 2"/>
+          <p:cNvSpPr>
+            <a:spLocks noGrp="1"/>
+          </p:cNvSpPr>
+          <p:nvPr>
+            <p:ph idx="1"/>
+          </p:nvPr>
+        </p:nvSpPr>
+        <p:spPr/>
+        <p:txBody>
+          <a:bodyPr/>
+          <a:lstStyle/>
+          <a:p>
+            <a:r>
+              <a:rPr lang="en-US" dirty="0" smtClean="0">
+                <a:hlinkClick r:id="rId2"/>
+              </a:rPr>
+              <a:t>Mozilla Developers Network (MDN)</a:t>
+            </a:r>
+            <a:endParaRPr lang="en-US" dirty="0" smtClean="0"/>
+          </a:p>
+          <a:p>
+            <a:r>
+              <a:rPr lang="en-US" dirty="0" smtClean="0">
+                <a:hlinkClick r:id="rId3"/>
+              </a:rPr>
+              <a:t>Stack Overflow</a:t>
+            </a:r>
+            <a:endParaRPr lang="en-US" dirty="0" smtClean="0"/>
+          </a:p>
+          <a:p>
+            <a:r>
+              <a:rPr lang="bg-BG" dirty="0" smtClean="0"/>
+              <a:t>Книги</a:t>
+            </a:r>
+          </a:p>
+          <a:p>
+            <a:pPr lvl="1"/>
+            <a:r>
+              <a:rPr lang="en-US" dirty="0" smtClean="0">
+                <a:hlinkClick r:id="rId4"/>
+              </a:rPr>
+              <a:t>JavaScript: The good parts</a:t>
+            </a:r>
+            <a:endParaRPr lang="en-US" dirty="0" smtClean="0"/>
+          </a:p>
+          <a:p>
+            <a:pPr lvl="1"/>
+            <a:r>
+              <a:rPr lang="en-US" dirty="0" smtClean="0">
+                <a:hlinkClick r:id="rId5"/>
+              </a:rPr>
+              <a:t>Eloquent JavaScript 2</a:t>
+            </a:r>
+            <a:r>
+              <a:rPr lang="en-US" baseline="30000" dirty="0" smtClean="0">
+                <a:hlinkClick r:id="rId5"/>
+              </a:rPr>
+              <a:t>nd</a:t>
+            </a:r>
+            <a:r>
+              <a:rPr lang="en-US" dirty="0" smtClean="0">
+                <a:hlinkClick r:id="rId5"/>
+              </a:rPr>
+              <a:t> edition</a:t>
+            </a:r>
+            <a:endParaRPr lang="en-US" dirty="0" smtClean="0"/>
+          </a:p>
+          <a:p>
+            <a:pPr lvl="1"/>
+            <a:r>
+              <a:rPr lang="en-US" dirty="0" smtClean="0">
+                <a:hlinkClick r:id="rId6"/>
+              </a:rPr>
+              <a:t>High Performance JavaScript</a:t>
+            </a:r>
+            <a:endParaRPr lang="en-US" dirty="0" smtClean="0"/>
+          </a:p>
+          <a:p>
+            <a:pPr lvl="1"/>
+            <a:endParaRPr lang="en-US" dirty="0"/>
+          </a:p>
+        </p:txBody>
+      </p:sp>
+      <p:pic>
+        <p:nvPicPr>
+          <p:cNvPr id="4" name="Picture 3"/>
+          <p:cNvPicPr>
+            <a:picLocks noChangeAspect="1"/>
+          </p:cNvPicPr>
+          <p:nvPr/>
+        </p:nvPicPr>
+        <p:blipFill>
+          <a:blip r:embed="rId7">
+            <a:extLst>
+              <a:ext uri="{28A0092B-C50C-407E-A947-70E740481C1C}">
+                <a14:useLocalDpi xmlns:a14="http://schemas.microsoft.com/office/drawing/2010/main" val="0"/>
+              </a:ext>
+            </a:extLst>
+          </a:blip>
+          <a:stretch>
+            <a:fillRect/>
+          </a:stretch>
+        </p:blipFill>
+        <p:spPr>
+          <a:xfrm>
+            <a:off x="9798235" y="609207"/>
+            <a:ext cx="2393765" cy="3121257"/>
+          </a:xfrm>
+          <a:prstGeom prst="rect">
+            <a:avLst/>
+          </a:prstGeom>
+        </p:spPr>
+      </p:pic>
+      <p:pic>
+        <p:nvPicPr>
+          <p:cNvPr id="5" name="Picture 4"/>
+          <p:cNvPicPr>
+            <a:picLocks noChangeAspect="1"/>
+          </p:cNvPicPr>
+          <p:nvPr/>
+        </p:nvPicPr>
+        <p:blipFill>
+          <a:blip r:embed="rId8" cstate="print">
+            <a:extLst>
+              <a:ext uri="{28A0092B-C50C-407E-A947-70E740481C1C}">
+                <a14:useLocalDpi xmlns:a14="http://schemas.microsoft.com/office/drawing/2010/main" val="0"/>
+              </a:ext>
+            </a:extLst>
+          </a:blip>
+          <a:stretch>
+            <a:fillRect/>
+          </a:stretch>
+        </p:blipFill>
+        <p:spPr>
+          <a:xfrm>
+            <a:off x="7421111" y="3730464"/>
+            <a:ext cx="2370551" cy="3121256"/>
+          </a:xfrm>
+          <a:prstGeom prst="rect">
+            <a:avLst/>
+          </a:prstGeom>
+        </p:spPr>
+      </p:pic>
+      <p:pic>
+        <p:nvPicPr>
+          <p:cNvPr id="6" name="Picture 5"/>
+          <p:cNvPicPr>
+            <a:picLocks noChangeAspect="1"/>
+          </p:cNvPicPr>
+          <p:nvPr/>
+        </p:nvPicPr>
+        <p:blipFill>
+          <a:blip r:embed="rId9">
+            <a:extLst>
+              <a:ext uri="{28A0092B-C50C-407E-A947-70E740481C1C}">
+                <a14:useLocalDpi xmlns:a14="http://schemas.microsoft.com/office/drawing/2010/main" val="0"/>
+              </a:ext>
+            </a:extLst>
+          </a:blip>
+          <a:stretch>
+            <a:fillRect/>
+          </a:stretch>
+        </p:blipFill>
+        <p:spPr>
+          <a:xfrm>
+            <a:off x="9811381" y="3730464"/>
+            <a:ext cx="2380619" cy="3121256"/>
+          </a:xfrm>
+          <a:prstGeom prst="rect">
+            <a:avLst/>
+          </a:prstGeom>
+        </p:spPr>
+      </p:pic>
+    </p:spTree>
+    <p:extLst>
+      <p:ext uri="{BB962C8B-B14F-4D97-AF65-F5344CB8AC3E}">
+        <p14:creationId xmlns:p14="http://schemas.microsoft.com/office/powerpoint/2010/main" val="39681291"/>
+      </p:ext>
+    </p:extLst>
+  </p:cSld>
+  <p:clrMapOvr>
+    <a:masterClrMapping/>
+  </p:clrMapOvr>
+</p:sld>
+</file>
+
+<file path=ppt/slides/slide13.xml><?xml version="1.0" encoding="utf-8"?>
 <p:sld xmlns:a="http://schemas.openxmlformats.org/drawingml/2006/main" xmlns:r="http://schemas.openxmlformats.org/officeDocument/2006/relationships" xmlns:p="http://schemas.openxmlformats.org/presentationml/2006/main">
   <p:cSld>
     <p:spTree>
@@ -6710,7 +7152,7 @@
           <a:p>
             <a:r>
               <a:rPr lang="bg-BG" dirty="0" smtClean="0"/>
-              <a:t>Какво ще учим</a:t>
+              <a:t>Лектор</a:t>
             </a:r>
             <a:endParaRPr lang="en-US" dirty="0"/>
           </a:p>
@@ -6718,7 +7160,7 @@
       </p:sp>
       <p:sp>
         <p:nvSpPr>
-          <p:cNvPr id="3" name="Content Placeholder 2"/>
+          <p:cNvPr id="5" name="Content Placeholder 4"/>
           <p:cNvSpPr>
             <a:spLocks noGrp="1"/>
           </p:cNvSpPr>
@@ -6728,110 +7170,80 @@
         </p:nvSpPr>
         <p:spPr/>
         <p:txBody>
-          <a:bodyPr>
-            <a:normAutofit fontScale="85000" lnSpcReduction="20000"/>
-          </a:bodyPr>
+          <a:bodyPr/>
           <a:lstStyle/>
           <a:p>
             <a:r>
               <a:rPr lang="bg-BG" dirty="0" smtClean="0"/>
-              <a:t>Първи стъпки в </a:t>
-            </a:r>
+              <a:t>Димитър Митев</a:t>
+            </a:r>
+          </a:p>
+          <a:p>
             <a:r>
               <a:rPr lang="en-US" dirty="0" smtClean="0"/>
-              <a:t>JS. </a:t>
+              <a:t>Full-stack developer </a:t>
             </a:r>
             <a:r>
               <a:rPr lang="bg-BG" dirty="0" smtClean="0"/>
-              <a:t>Типове данни. Операции и изрази</a:t>
-            </a:r>
-          </a:p>
-          <a:p>
-            <a:r>
-              <a:rPr lang="bg-BG" dirty="0" smtClean="0"/>
-              <a:t>Логически блокове и цикли</a:t>
-            </a:r>
-          </a:p>
-          <a:p>
-            <a:r>
-              <a:rPr lang="bg-BG" dirty="0" smtClean="0"/>
-              <a:t>Функции</a:t>
-            </a:r>
-          </a:p>
-          <a:p>
-            <a:r>
-              <a:rPr lang="bg-BG" dirty="0" smtClean="0"/>
-              <a:t>Обектно ориентирано програмиране с </a:t>
-            </a:r>
+              <a:t>в </a:t>
+            </a:r>
+            <a:r>
+              <a:rPr lang="en-US" dirty="0" smtClean="0">
+                <a:hlinkClick r:id="rId2"/>
+              </a:rPr>
+              <a:t>Bulpros</a:t>
+            </a:r>
+            <a:endParaRPr lang="en-US" dirty="0"/>
+          </a:p>
+          <a:p>
             <a:r>
               <a:rPr lang="en-US" dirty="0" smtClean="0"/>
-              <a:t>JS</a:t>
-            </a:r>
-          </a:p>
-          <a:p>
-            <a:r>
-              <a:rPr lang="en-US" dirty="0" smtClean="0"/>
-              <a:t>DOM</a:t>
-            </a:r>
-            <a:r>
-              <a:rPr lang="bg-BG" dirty="0" smtClean="0"/>
-              <a:t> и </a:t>
-            </a:r>
-            <a:r>
-              <a:rPr lang="en-US" dirty="0" smtClean="0"/>
-              <a:t>DOM </a:t>
-            </a:r>
-            <a:r>
-              <a:rPr lang="bg-BG" dirty="0" smtClean="0"/>
-              <a:t>манипулации</a:t>
-            </a:r>
-          </a:p>
-          <a:p>
-            <a:r>
-              <a:rPr lang="en-US" dirty="0" smtClean="0"/>
-              <a:t>CSS </a:t>
-            </a:r>
-            <a:r>
-              <a:rPr lang="bg-BG" dirty="0" smtClean="0"/>
-              <a:t>модификации</a:t>
-            </a:r>
-          </a:p>
-          <a:p>
-            <a:r>
-              <a:rPr lang="bg-BG" dirty="0" smtClean="0"/>
-              <a:t>Събития (</a:t>
-            </a:r>
-            <a:r>
-              <a:rPr lang="en-US" dirty="0" smtClean="0"/>
-              <a:t>Events)</a:t>
-            </a:r>
-          </a:p>
-          <a:p>
-            <a:r>
-              <a:rPr lang="bg-BG" dirty="0" smtClean="0"/>
-              <a:t>Заявки</a:t>
+              <a:t>Freelancer</a:t>
             </a:r>
             <a:endParaRPr lang="en-US" dirty="0"/>
           </a:p>
         </p:txBody>
       </p:sp>
+      <p:pic>
+        <p:nvPicPr>
+          <p:cNvPr id="6" name="Picture 5"/>
+          <p:cNvPicPr>
+            <a:picLocks noChangeAspect="1"/>
+          </p:cNvPicPr>
+          <p:nvPr/>
+        </p:nvPicPr>
+        <p:blipFill>
+          <a:blip r:embed="rId3">
+            <a:extLst>
+              <a:ext uri="{28A0092B-C50C-407E-A947-70E740481C1C}">
+                <a14:useLocalDpi xmlns:a14="http://schemas.microsoft.com/office/drawing/2010/main" val="0"/>
+              </a:ext>
+            </a:extLst>
+          </a:blip>
+          <a:stretch>
+            <a:fillRect/>
+          </a:stretch>
+        </p:blipFill>
+        <p:spPr>
+          <a:xfrm>
+            <a:off x="8888875" y="3110561"/>
+            <a:ext cx="3303125" cy="3747439"/>
+          </a:xfrm>
+          <a:prstGeom prst="rect">
+            <a:avLst/>
+          </a:prstGeom>
+        </p:spPr>
+      </p:pic>
     </p:spTree>
     <p:extLst>
       <p:ext uri="{BB962C8B-B14F-4D97-AF65-F5344CB8AC3E}">
-        <p14:creationId xmlns:p14="http://schemas.microsoft.com/office/powerpoint/2010/main" val="3979871113"/>
+        <p14:creationId xmlns:p14="http://schemas.microsoft.com/office/powerpoint/2010/main" val="1894646579"/>
       </p:ext>
     </p:extLst>
   </p:cSld>
   <p:clrMapOvr>
     <a:masterClrMapping/>
   </p:clrMapOvr>
-  <p:timing>
-    <p:tnLst>
-      <p:par>
-        <p:cTn id="1" dur="indefinite" restart="never" nodeType="tmRoot"/>
-      </p:par>
-    </p:tnLst>
-  </p:timing>
 </p:sld>
 </file>
 
@@ -6869,87 +7281,107 @@
           <a:p>
             <a:r>
               <a:rPr lang="bg-BG" dirty="0" smtClean="0"/>
-              <a:t>Същност и история на </a:t>
+              <a:t>Какво ще учим</a:t>
+            </a:r>
+            <a:endParaRPr lang="en-US" dirty="0"/>
+          </a:p>
+        </p:txBody>
+      </p:sp>
+      <p:sp>
+        <p:nvSpPr>
+          <p:cNvPr id="3" name="Content Placeholder 2"/>
+          <p:cNvSpPr>
+            <a:spLocks noGrp="1"/>
+          </p:cNvSpPr>
+          <p:nvPr>
+            <p:ph idx="1"/>
+          </p:nvPr>
+        </p:nvSpPr>
+        <p:spPr/>
+        <p:txBody>
+          <a:bodyPr>
+            <a:normAutofit fontScale="85000" lnSpcReduction="20000"/>
+          </a:bodyPr>
+          <a:lstStyle/>
+          <a:p>
+            <a:r>
+              <a:rPr lang="bg-BG" dirty="0" smtClean="0"/>
+              <a:t>Първи стъпки в </a:t>
             </a:r>
             <a:r>
               <a:rPr lang="en-US" dirty="0" smtClean="0"/>
-              <a:t>JavaScript</a:t>
-            </a:r>
-            <a:endParaRPr lang="en-US" dirty="0"/>
-          </a:p>
-        </p:txBody>
-      </p:sp>
-      <p:sp>
-        <p:nvSpPr>
-          <p:cNvPr id="3" name="Content Placeholder 2"/>
-          <p:cNvSpPr>
-            <a:spLocks noGrp="1"/>
-          </p:cNvSpPr>
-          <p:nvPr>
-            <p:ph idx="1"/>
-          </p:nvPr>
-        </p:nvSpPr>
-        <p:spPr/>
-        <p:txBody>
-          <a:bodyPr/>
-          <a:lstStyle/>
-          <a:p>
+              <a:t>JS. </a:t>
+            </a:r>
             <a:r>
               <a:rPr lang="bg-BG" dirty="0" smtClean="0"/>
-              <a:t>Създаден от </a:t>
+              <a:t>Типове данни. Операции и изрази</a:t>
+            </a:r>
+          </a:p>
+          <a:p>
+            <a:r>
+              <a:rPr lang="bg-BG" dirty="0" smtClean="0"/>
+              <a:t>Логически блокове и цикли</a:t>
+            </a:r>
+          </a:p>
+          <a:p>
+            <a:r>
+              <a:rPr lang="bg-BG" dirty="0" smtClean="0"/>
+              <a:t>Функции</a:t>
+            </a:r>
+          </a:p>
+          <a:p>
+            <a:r>
+              <a:rPr lang="bg-BG" dirty="0" smtClean="0"/>
+              <a:t>Обектно ориентирано програмиране с </a:t>
             </a:r>
             <a:r>
               <a:rPr lang="en-US" dirty="0" smtClean="0"/>
-              <a:t>Netscape </a:t>
+              <a:t>JS</a:t>
+            </a:r>
+          </a:p>
+          <a:p>
+            <a:r>
+              <a:rPr lang="en-US" dirty="0" smtClean="0"/>
+              <a:t>DOM</a:t>
             </a:r>
             <a:r>
               <a:rPr lang="bg-BG" dirty="0" smtClean="0"/>
-              <a:t>през 1995г.</a:t>
-            </a:r>
-          </a:p>
-          <a:p>
+              <a:t> и </a:t>
+            </a:r>
+            <a:r>
+              <a:rPr lang="en-US" dirty="0" smtClean="0"/>
+              <a:t>DOM </a:t>
+            </a:r>
             <a:r>
               <a:rPr lang="bg-BG" dirty="0" smtClean="0"/>
-              <a:t>Официално стандартизиран през 1996г. </a:t>
-            </a:r>
-            <a:r>
-              <a:rPr lang="en-US" dirty="0" smtClean="0">
-                <a:hlinkClick r:id="rId2"/>
-              </a:rPr>
-              <a:t>ECMA</a:t>
-            </a:r>
-            <a:endParaRPr lang="bg-BG" dirty="0" smtClean="0"/>
+              <a:t>манипулации</a:t>
+            </a:r>
           </a:p>
           <a:p>
             <a:r>
               <a:rPr lang="en-US" dirty="0" smtClean="0"/>
-              <a:t>High-level</a:t>
+              <a:t>CSS </a:t>
             </a:r>
             <a:r>
               <a:rPr lang="bg-BG" dirty="0" smtClean="0"/>
-              <a:t>, динамичен, </a:t>
-            </a:r>
-            <a:r>
-              <a:rPr lang="bg-BG" b="1" dirty="0" smtClean="0"/>
-              <a:t>нетипизиран</a:t>
-            </a:r>
+              <a:t>модификации</a:t>
+            </a:r>
+          </a:p>
+          <a:p>
             <a:r>
               <a:rPr lang="bg-BG" dirty="0" smtClean="0"/>
-              <a:t>, интерпретеран програмен език</a:t>
-            </a:r>
-            <a:endParaRPr lang="en-US" dirty="0" smtClean="0"/>
-          </a:p>
-          <a:p>
+              <a:t>Събития (</a:t>
+            </a:r>
             <a:r>
               <a:rPr lang="en-US" dirty="0" smtClean="0"/>
-              <a:t>End-to-end </a:t>
-            </a:r>
+              <a:t>Events)</a:t>
+            </a:r>
+          </a:p>
+          <a:p>
             <a:r>
               <a:rPr lang="bg-BG" dirty="0" smtClean="0"/>
-              <a:t>език</a:t>
-            </a:r>
-          </a:p>
-          <a:p>
+              <a:t>Заявки</a:t>
+            </a:r>
             <a:endParaRPr lang="en-US" dirty="0"/>
           </a:p>
         </p:txBody>
@@ -6957,7 +7389,7 @@
     </p:spTree>
     <p:extLst>
       <p:ext uri="{BB962C8B-B14F-4D97-AF65-F5344CB8AC3E}">
-        <p14:creationId xmlns:p14="http://schemas.microsoft.com/office/powerpoint/2010/main" val="1260506942"/>
+        <p14:creationId xmlns:p14="http://schemas.microsoft.com/office/powerpoint/2010/main" val="3979871113"/>
       </p:ext>
     </p:extLst>
   </p:cSld>
@@ -7008,6 +7440,145 @@
           <a:p>
             <a:r>
               <a:rPr lang="bg-BG" dirty="0" smtClean="0"/>
+              <a:t>Същност и история на </a:t>
+            </a:r>
+            <a:r>
+              <a:rPr lang="en-US" dirty="0" smtClean="0"/>
+              <a:t>JavaScript</a:t>
+            </a:r>
+            <a:endParaRPr lang="en-US" dirty="0"/>
+          </a:p>
+        </p:txBody>
+      </p:sp>
+      <p:sp>
+        <p:nvSpPr>
+          <p:cNvPr id="3" name="Content Placeholder 2"/>
+          <p:cNvSpPr>
+            <a:spLocks noGrp="1"/>
+          </p:cNvSpPr>
+          <p:nvPr>
+            <p:ph idx="1"/>
+          </p:nvPr>
+        </p:nvSpPr>
+        <p:spPr/>
+        <p:txBody>
+          <a:bodyPr/>
+          <a:lstStyle/>
+          <a:p>
+            <a:r>
+              <a:rPr lang="bg-BG" dirty="0" smtClean="0"/>
+              <a:t>Създаден от </a:t>
+            </a:r>
+            <a:r>
+              <a:rPr lang="en-US" dirty="0" smtClean="0"/>
+              <a:t>Netscape </a:t>
+            </a:r>
+            <a:r>
+              <a:rPr lang="bg-BG" dirty="0" smtClean="0"/>
+              <a:t>през 1995г.</a:t>
+            </a:r>
+          </a:p>
+          <a:p>
+            <a:r>
+              <a:rPr lang="bg-BG" dirty="0" smtClean="0"/>
+              <a:t>Официално стандартизиран през 1996г. </a:t>
+            </a:r>
+            <a:r>
+              <a:rPr lang="en-US" dirty="0" smtClean="0">
+                <a:hlinkClick r:id="rId2"/>
+              </a:rPr>
+              <a:t>ECMA</a:t>
+            </a:r>
+            <a:endParaRPr lang="bg-BG" dirty="0" smtClean="0"/>
+          </a:p>
+          <a:p>
+            <a:r>
+              <a:rPr lang="en-US" dirty="0" smtClean="0"/>
+              <a:t>High-level</a:t>
+            </a:r>
+            <a:r>
+              <a:rPr lang="bg-BG" dirty="0" smtClean="0"/>
+              <a:t>, динамичен, </a:t>
+            </a:r>
+            <a:r>
+              <a:rPr lang="bg-BG" b="1" dirty="0" smtClean="0"/>
+              <a:t>нетипизиран</a:t>
+            </a:r>
+            <a:r>
+              <a:rPr lang="bg-BG" dirty="0" smtClean="0"/>
+              <a:t>, интерпретеран програмен език</a:t>
+            </a:r>
+            <a:endParaRPr lang="en-US" dirty="0" smtClean="0"/>
+          </a:p>
+          <a:p>
+            <a:r>
+              <a:rPr lang="en-US" dirty="0" smtClean="0"/>
+              <a:t>End-to-end </a:t>
+            </a:r>
+            <a:r>
+              <a:rPr lang="bg-BG" dirty="0" smtClean="0"/>
+              <a:t>език</a:t>
+            </a:r>
+          </a:p>
+          <a:p>
+            <a:endParaRPr lang="en-US" dirty="0"/>
+          </a:p>
+        </p:txBody>
+      </p:sp>
+    </p:spTree>
+    <p:extLst>
+      <p:ext uri="{BB962C8B-B14F-4D97-AF65-F5344CB8AC3E}">
+        <p14:creationId xmlns:p14="http://schemas.microsoft.com/office/powerpoint/2010/main" val="1260506942"/>
+      </p:ext>
+    </p:extLst>
+  </p:cSld>
+  <p:clrMapOvr>
+    <a:masterClrMapping/>
+  </p:clrMapOvr>
+  <p:timing>
+    <p:tnLst>
+      <p:par>
+        <p:cTn id="1" dur="indefinite" restart="never" nodeType="tmRoot"/>
+      </p:par>
+    </p:tnLst>
+  </p:timing>
+</p:sld>
+</file>
+
+<file path=ppt/slides/slide5.xml><?xml version="1.0" encoding="utf-8"?>
+<p:sld xmlns:a="http://schemas.openxmlformats.org/drawingml/2006/main" xmlns:r="http://schemas.openxmlformats.org/officeDocument/2006/relationships" xmlns:p="http://schemas.openxmlformats.org/presentationml/2006/main">
+  <p:cSld>
+    <p:spTree>
+      <p:nvGrpSpPr>
+        <p:cNvPr id="1" name=""/>
+        <p:cNvGrpSpPr/>
+        <p:nvPr/>
+      </p:nvGrpSpPr>
+      <p:grpSpPr>
+        <a:xfrm>
+          <a:off x="0" y="0"/>
+          <a:ext cx="0" cy="0"/>
+          <a:chOff x="0" y="0"/>
+          <a:chExt cx="0" cy="0"/>
+        </a:xfrm>
+      </p:grpSpPr>
+      <p:sp>
+        <p:nvSpPr>
+          <p:cNvPr id="2" name="Title 1"/>
+          <p:cNvSpPr>
+            <a:spLocks noGrp="1"/>
+          </p:cNvSpPr>
+          <p:nvPr>
+            <p:ph type="title"/>
+          </p:nvPr>
+        </p:nvSpPr>
+        <p:spPr/>
+        <p:txBody>
+          <a:bodyPr/>
+          <a:lstStyle/>
+          <a:p>
+            <a:r>
+              <a:rPr lang="bg-BG" dirty="0" smtClean="0"/>
               <a:t>Приложение на </a:t>
             </a:r>
             <a:r>
@@ -7162,7 +7733,7 @@
 </p:sld>
 </file>
 
-<file path=ppt/slides/slide5.xml><?xml version="1.0" encoding="utf-8"?>
+<file path=ppt/slides/slide6.xml><?xml version="1.0" encoding="utf-8"?>
 <p:sld xmlns:a="http://schemas.openxmlformats.org/drawingml/2006/main" xmlns:r="http://schemas.openxmlformats.org/officeDocument/2006/relationships" xmlns:p="http://schemas.openxmlformats.org/presentationml/2006/main">
   <p:cSld>
     <p:spTree>
@@ -7396,7 +7967,7 @@
 </p:sld>
 </file>
 
-<file path=ppt/slides/slide6.xml><?xml version="1.0" encoding="utf-8"?>
+<file path=ppt/slides/slide7.xml><?xml version="1.0" encoding="utf-8"?>
 <p:sld xmlns:a="http://schemas.openxmlformats.org/drawingml/2006/main" xmlns:r="http://schemas.openxmlformats.org/officeDocument/2006/relationships" xmlns:p="http://schemas.openxmlformats.org/presentationml/2006/main">
   <p:cSld>
     <p:spTree>
@@ -7535,7 +8106,7 @@
 </p:sld>
 </file>
 
-<file path=ppt/slides/slide7.xml><?xml version="1.0" encoding="utf-8"?>
+<file path=ppt/slides/slide8.xml><?xml version="1.0" encoding="utf-8"?>
 <p:sld xmlns:a="http://schemas.openxmlformats.org/drawingml/2006/main" xmlns:r="http://schemas.openxmlformats.org/officeDocument/2006/relationships" xmlns:p="http://schemas.openxmlformats.org/presentationml/2006/main">
   <p:cSld>
     <p:spTree>
@@ -7774,206 +8345,6 @@
 </p:sld>
 </file>
 
-<file path=ppt/slides/slide8.xml><?xml version="1.0" encoding="utf-8"?>
-<p:sld xmlns:a="http://schemas.openxmlformats.org/drawingml/2006/main" xmlns:r="http://schemas.openxmlformats.org/officeDocument/2006/relationships" xmlns:p="http://schemas.openxmlformats.org/presentationml/2006/main">
-  <p:cSld>
-    <p:spTree>
-      <p:nvGrpSpPr>
-        <p:cNvPr id="1" name=""/>
-        <p:cNvGrpSpPr/>
-        <p:nvPr/>
-      </p:nvGrpSpPr>
-      <p:grpSpPr>
-        <a:xfrm>
-          <a:off x="0" y="0"/>
-          <a:ext cx="0" cy="0"/>
-          <a:chOff x="0" y="0"/>
-          <a:chExt cx="0" cy="0"/>
-        </a:xfrm>
-      </p:grpSpPr>
-      <p:sp>
-        <p:nvSpPr>
-          <p:cNvPr id="2" name="Title 1"/>
-          <p:cNvSpPr>
-            <a:spLocks noGrp="1"/>
-          </p:cNvSpPr>
-          <p:nvPr>
-            <p:ph type="title"/>
-          </p:nvPr>
-        </p:nvSpPr>
-        <p:spPr/>
-        <p:txBody>
-          <a:bodyPr/>
-          <a:lstStyle/>
-          <a:p>
-            <a:r>
-              <a:rPr lang="bg-BG" dirty="0" smtClean="0"/>
-              <a:t>Какво още ни трябва?</a:t>
-            </a:r>
-            <a:endParaRPr lang="en-US" dirty="0"/>
-          </a:p>
-        </p:txBody>
-      </p:sp>
-      <p:sp>
-        <p:nvSpPr>
-          <p:cNvPr id="3" name="Content Placeholder 2"/>
-          <p:cNvSpPr>
-            <a:spLocks noGrp="1"/>
-          </p:cNvSpPr>
-          <p:nvPr>
-            <p:ph idx="1"/>
-          </p:nvPr>
-        </p:nvSpPr>
-        <p:spPr/>
-        <p:txBody>
-          <a:bodyPr>
-            <a:normAutofit fontScale="85000" lnSpcReduction="20000"/>
-          </a:bodyPr>
-          <a:lstStyle/>
-          <a:p>
-            <a:r>
-              <a:rPr lang="bg-BG" dirty="0" smtClean="0"/>
-              <a:t>Последна версия на браузър</a:t>
-            </a:r>
-          </a:p>
-          <a:p>
-            <a:pPr lvl="1"/>
-            <a:r>
-              <a:rPr lang="en-US" b="1" dirty="0" smtClean="0"/>
-              <a:t>Google Chrome</a:t>
-            </a:r>
-          </a:p>
-          <a:p>
-            <a:pPr lvl="1"/>
-            <a:r>
-              <a:rPr lang="en-US" dirty="0" smtClean="0"/>
-              <a:t>Mozilla Firefox</a:t>
-            </a:r>
-          </a:p>
-          <a:p>
-            <a:pPr lvl="1"/>
-            <a:r>
-              <a:rPr lang="en-US" dirty="0" smtClean="0"/>
-              <a:t>Opera</a:t>
-            </a:r>
-          </a:p>
-          <a:p>
-            <a:pPr lvl="1"/>
-            <a:r>
-              <a:rPr lang="en-US" dirty="0" smtClean="0"/>
-              <a:t>Safari</a:t>
-            </a:r>
-          </a:p>
-          <a:p>
-            <a:r>
-              <a:rPr lang="bg-BG" dirty="0" smtClean="0"/>
-              <a:t>Приставки (</a:t>
-            </a:r>
-            <a:r>
-              <a:rPr lang="en-US" dirty="0" err="1" smtClean="0"/>
-              <a:t>addons</a:t>
-            </a:r>
-            <a:r>
-              <a:rPr lang="en-US" dirty="0" smtClean="0"/>
-              <a:t>)</a:t>
-            </a:r>
-          </a:p>
-          <a:p>
-            <a:pPr lvl="1"/>
-            <a:r>
-              <a:rPr lang="en-US" dirty="0" smtClean="0">
-                <a:hlinkClick r:id="rId2"/>
-              </a:rPr>
-              <a:t>Web Developer</a:t>
-            </a:r>
-            <a:r>
-              <a:rPr lang="en-US" dirty="0" smtClean="0"/>
-              <a:t> -&gt; </a:t>
-            </a:r>
-            <a:r>
-              <a:rPr lang="bg-BG" dirty="0" smtClean="0"/>
-              <a:t>управление на </a:t>
-            </a:r>
-            <a:r>
-              <a:rPr lang="en-US" dirty="0" smtClean="0"/>
-              <a:t>HTML, CSS &amp; JS </a:t>
-            </a:r>
-            <a:r>
-              <a:rPr lang="bg-BG" dirty="0" smtClean="0"/>
-              <a:t>съдържание на страницата</a:t>
-            </a:r>
-            <a:endParaRPr lang="en-US" dirty="0" smtClean="0"/>
-          </a:p>
-          <a:p>
-            <a:pPr lvl="1"/>
-            <a:r>
-              <a:rPr lang="en-US" dirty="0" smtClean="0">
-                <a:hlinkClick r:id="rId3"/>
-              </a:rPr>
-              <a:t>Postman</a:t>
-            </a:r>
-            <a:r>
-              <a:rPr lang="bg-BG" dirty="0" smtClean="0"/>
-              <a:t> -&gt; създаване и изпращане на заявки</a:t>
-            </a:r>
-          </a:p>
-          <a:p>
-            <a:pPr lvl="1"/>
-            <a:r>
-              <a:rPr lang="en-US" dirty="0" smtClean="0">
-                <a:hlinkClick r:id="rId4"/>
-              </a:rPr>
-              <a:t>FireBu</a:t>
-            </a:r>
-            <a:r>
-              <a:rPr lang="en-US" dirty="0">
-                <a:hlinkClick r:id="rId4"/>
-              </a:rPr>
-              <a:t>g</a:t>
-            </a:r>
-            <a:r>
-              <a:rPr lang="en-US" dirty="0" smtClean="0"/>
-              <a:t> -&gt; </a:t>
-            </a:r>
-            <a:r>
-              <a:rPr lang="bg-BG" dirty="0" smtClean="0"/>
-              <a:t>добавя доста възможности за управление на </a:t>
-            </a:r>
-            <a:r>
-              <a:rPr lang="en-US" dirty="0" smtClean="0"/>
-              <a:t>JS</a:t>
-            </a:r>
-            <a:r>
-              <a:rPr lang="bg-BG" dirty="0" smtClean="0"/>
-              <a:t> и съдържанието към </a:t>
-            </a:r>
-            <a:r>
-              <a:rPr lang="en-US" dirty="0" smtClean="0"/>
-              <a:t>Firefox</a:t>
-            </a:r>
-          </a:p>
-        </p:txBody>
-      </p:sp>
-    </p:spTree>
-    <p:extLst>
-      <p:ext uri="{BB962C8B-B14F-4D97-AF65-F5344CB8AC3E}">
-        <p14:creationId xmlns:p14="http://schemas.microsoft.com/office/powerpoint/2010/main" val="3332930778"/>
-      </p:ext>
-    </p:extLst>
-  </p:cSld>
-  <p:clrMapOvr>
-    <a:masterClrMapping/>
-  </p:clrMapOvr>
-  <p:timing>
-    <p:tnLst>
-      <p:par>
-        <p:cTn id="1" dur="indefinite" restart="never" nodeType="tmRoot"/>
-      </p:par>
-    </p:tnLst>
-  </p:timing>
-</p:sld>
-</file>
-
 <file path=ppt/slides/slide9.xml><?xml version="1.0" encoding="utf-8"?>
 <p:sld xmlns:a="http://schemas.openxmlformats.org/drawingml/2006/main" xmlns:r="http://schemas.openxmlformats.org/officeDocument/2006/relationships" xmlns:p="http://schemas.openxmlformats.org/presentationml/2006/main">
   <p:cSld>
@@ -8008,7 +8379,7 @@
           <a:p>
             <a:r>
               <a:rPr lang="bg-BG" dirty="0" smtClean="0"/>
-              <a:t>Дебъгване и намиране на грешки</a:t>
+              <a:t>Какво още ни трябва?</a:t>
             </a:r>
             <a:endParaRPr lang="en-US" dirty="0"/>
           </a:p>
@@ -8027,44 +8398,64 @@
         <p:spPr/>
         <p:txBody>
           <a:bodyPr>
-            <a:normAutofit lnSpcReduction="10000"/>
+            <a:normAutofit fontScale="85000" lnSpcReduction="20000"/>
           </a:bodyPr>
           <a:lstStyle/>
           <a:p>
             <a:r>
               <a:rPr lang="bg-BG" dirty="0" smtClean="0"/>
-              <a:t>Интернет браузър</a:t>
+              <a:t>Последна версия на браузър</a:t>
             </a:r>
           </a:p>
           <a:p>
             <a:pPr lvl="1"/>
             <a:r>
+              <a:rPr lang="en-US" b="1" dirty="0" smtClean="0"/>
+              <a:t>Google Chrome</a:t>
+            </a:r>
+          </a:p>
+          <a:p>
+            <a:pPr lvl="1"/>
+            <a:r>
+              <a:rPr lang="en-US" dirty="0" smtClean="0"/>
+              <a:t>Mozilla Firefox</a:t>
+            </a:r>
+          </a:p>
+          <a:p>
+            <a:pPr lvl="1"/>
+            <a:r>
+              <a:rPr lang="en-US" dirty="0" smtClean="0"/>
+              <a:t>Opera</a:t>
+            </a:r>
+          </a:p>
+          <a:p>
+            <a:pPr lvl="1"/>
+            <a:r>
+              <a:rPr lang="en-US" dirty="0" smtClean="0"/>
+              <a:t>Safari</a:t>
+            </a:r>
+          </a:p>
+          <a:p>
+            <a:r>
               <a:rPr lang="bg-BG" dirty="0" smtClean="0"/>
-              <a:t>Съвременните браузъри предоставят богат набор от инструменти за дебъгване</a:t>
+              <a:t>Приставки (</a:t>
+            </a:r>
+            <a:r>
+              <a:rPr lang="en-US" dirty="0" err="1" smtClean="0"/>
+              <a:t>addons</a:t>
+            </a:r>
+            <a:r>
+              <a:rPr lang="en-US" dirty="0" smtClean="0"/>
+              <a:t>)</a:t>
             </a:r>
           </a:p>
           <a:p>
             <a:pPr lvl="1"/>
-            <a:r>
-              <a:rPr lang="en-US" dirty="0" smtClean="0"/>
-              <a:t>F12 </a:t>
-            </a:r>
-            <a:r>
-              <a:rPr lang="bg-BG" dirty="0" smtClean="0"/>
-              <a:t>инструменти</a:t>
-            </a:r>
-          </a:p>
-          <a:p>
-            <a:pPr lvl="1"/>
-            <a:r>
-              <a:rPr lang="bg-BG" dirty="0" smtClean="0"/>
-              <a:t>*</a:t>
-            </a:r>
             <a:r>
               <a:rPr lang="en-US" dirty="0" smtClean="0">
                 <a:hlinkClick r:id="rId2"/>
               </a:rPr>
-              <a:t>FireBug</a:t>
+              <a:t>Web Developer</a:t>
             </a:r>
             <a:r>
               <a:rPr lang="en-US" dirty="0" smtClean="0"/>
@@ -8072,94 +8463,72 @@
             </a:r>
             <a:r>
               <a:rPr lang="bg-BG" dirty="0" smtClean="0"/>
-              <a:t>ако използвате </a:t>
+              <a:t>управление на </a:t>
             </a:r>
             <a:r>
               <a:rPr lang="en-US" dirty="0" smtClean="0"/>
-              <a:t>Mozilla Firefox</a:t>
-            </a:r>
-          </a:p>
-          <a:p>
+              <a:t>HTML, CSS &amp; JS </a:t>
+            </a:r>
+            <a:r>
+              <a:rPr lang="bg-BG" dirty="0" smtClean="0"/>
+              <a:t>съдържание на страницата</a:t>
+            </a:r>
+            <a:endParaRPr lang="en-US" dirty="0" smtClean="0"/>
+          </a:p>
+          <a:p>
+            <a:pPr lvl="1"/>
+            <a:r>
+              <a:rPr lang="en-US" dirty="0" smtClean="0">
+                <a:hlinkClick r:id="rId3"/>
+              </a:rPr>
+              <a:t>Postman</a:t>
+            </a:r>
+            <a:r>
+              <a:rPr lang="bg-BG" dirty="0" smtClean="0"/>
+              <a:t> -&gt; създаване и изпращане на заявки</a:t>
+            </a:r>
+          </a:p>
+          <a:p>
+            <a:pPr lvl="1"/>
+            <a:r>
+              <a:rPr lang="en-US" dirty="0" smtClean="0">
+                <a:hlinkClick r:id="rId4"/>
+              </a:rPr>
+              <a:t>FireBu</a:t>
+            </a:r>
+            <a:r>
+              <a:rPr lang="en-US" dirty="0">
+                <a:hlinkClick r:id="rId4"/>
+              </a:rPr>
+              <a:t>g</a:t>
+            </a:r>
             <a:r>
               <a:rPr lang="en-US" dirty="0" smtClean="0"/>
-              <a:t>IDE</a:t>
-            </a:r>
-          </a:p>
-          <a:p>
-            <a:pPr lvl="1"/>
+              <a:t> -&gt; </a:t>
+            </a:r>
+            <a:r>
+              <a:rPr lang="bg-BG" dirty="0" smtClean="0"/>
+              <a:t>добавя доста възможности за управление на </a:t>
+            </a:r>
             <a:r>
               <a:rPr lang="en-US" dirty="0" smtClean="0"/>
-              <a:t>WebStorm </a:t>
+              <a:t>JS</a:t>
             </a:r>
             <a:r>
               <a:rPr lang="bg-BG" dirty="0" smtClean="0"/>
-              <a:t>предоставя доста добри възможности за дебъгване на  </a:t>
+              <a:t> и съдържанието към </a:t>
             </a:r>
             <a:r>
               <a:rPr lang="en-US" dirty="0" smtClean="0"/>
-              <a:t>JS </a:t>
-            </a:r>
-            <a:r>
-              <a:rPr lang="bg-BG" dirty="0" smtClean="0"/>
-              <a:t>код</a:t>
-            </a:r>
-          </a:p>
-          <a:p>
-            <a:pPr lvl="1"/>
-            <a:r>
-              <a:rPr lang="en-US" dirty="0" smtClean="0"/>
-              <a:t>Visual Studio</a:t>
-            </a:r>
-            <a:r>
-              <a:rPr lang="bg-BG" dirty="0" smtClean="0"/>
-              <a:t> също дава добри възмоности за дебъгване на </a:t>
-            </a:r>
-            <a:r>
-              <a:rPr lang="en-US" dirty="0" smtClean="0"/>
-              <a:t>JS </a:t>
-            </a:r>
-            <a:r>
-              <a:rPr lang="bg-BG" dirty="0" smtClean="0"/>
-              <a:t>код</a:t>
-            </a:r>
-            <a:endParaRPr lang="en-US" dirty="0"/>
-          </a:p>
-        </p:txBody>
-      </p:sp>
-      <p:pic>
-        <p:nvPicPr>
-          <p:cNvPr id="4" name="Picture 3"/>
-          <p:cNvPicPr>
-            <a:picLocks noChangeAspect="1"/>
-          </p:cNvPicPr>
-          <p:nvPr/>
-        </p:nvPicPr>
-        <p:blipFill>
-          <a:blip r:embed="rId3" cstate="print">
-            <a:extLst>
-              <a:ext uri="{28A0092B-C50C-407E-A947-70E740481C1C}">
-                <a14:useLocalDpi xmlns:a14="http://schemas.microsoft.com/office/drawing/2010/main" val="0"/>
-              </a:ext>
-            </a:extLst>
-          </a:blip>
-          <a:stretch>
-            <a:fillRect/>
-          </a:stretch>
-        </p:blipFill>
-        <p:spPr>
-          <a:xfrm>
-            <a:off x="10181207" y="4927106"/>
-            <a:ext cx="1930893" cy="1930893"/>
-          </a:xfrm>
-          <a:prstGeom prst="rect">
-            <a:avLst/>
-          </a:prstGeom>
-        </p:spPr>
-      </p:pic>
+              <a:t>Firefox</a:t>
+            </a:r>
+          </a:p>
+        </p:txBody>
+      </p:sp>
     </p:spTree>
     <p:extLst>
       <p:ext uri="{BB962C8B-B14F-4D97-AF65-F5344CB8AC3E}">
-        <p14:creationId xmlns:p14="http://schemas.microsoft.com/office/powerpoint/2010/main" val="2805176583"/>
+        <p14:creationId xmlns:p14="http://schemas.microsoft.com/office/powerpoint/2010/main" val="3332930778"/>
       </p:ext>
     </p:extLst>
   </p:cSld>

</xml_diff>